<commit_message>
Learning the Toolkit section content
</commit_message>
<xml_diff>
--- a/docs/setup/images/fast-start-install.pptx
+++ b/docs/setup/images/fast-start-install.pptx
@@ -107,6 +107,11 @@
       </a:defRPr>
     </a:lvl9pPr>
   </p:defaultTextStyle>
+  <p:extLst>
+    <p:ext uri="{EFAFB233-063F-42B5-8137-9DF3F51BA10A}">
+      <p15:sldGuideLst xmlns:p15="http://schemas.microsoft.com/office/powerpoint/2012/main"/>
+    </p:ext>
+  </p:extLst>
 </p:presentation>
 </file>
 
@@ -192,7 +197,7 @@
           <a:p>
             <a:fld id="{A9507E16-6659-744F-93FF-F15AFCC9ABB8}" type="datetimeFigureOut">
               <a:rPr lang="en-US" smtClean="0"/>
-              <a:t>4/28/21</a:t>
+              <a:t>5/11/21</a:t>
             </a:fld>
             <a:endParaRPr lang="en-US"/>
           </a:p>
@@ -693,7 +698,7 @@
           <a:p>
             <a:fld id="{F1C55FD9-E805-0344-84D3-A9CEAACA356E}" type="datetimeFigureOut">
               <a:rPr lang="en-US" smtClean="0"/>
-              <a:t>4/28/21</a:t>
+              <a:t>5/11/21</a:t>
             </a:fld>
             <a:endParaRPr lang="en-US"/>
           </a:p>
@@ -893,7 +898,7 @@
           <a:p>
             <a:fld id="{F1C55FD9-E805-0344-84D3-A9CEAACA356E}" type="datetimeFigureOut">
               <a:rPr lang="en-US" smtClean="0"/>
-              <a:t>4/28/21</a:t>
+              <a:t>5/11/21</a:t>
             </a:fld>
             <a:endParaRPr lang="en-US"/>
           </a:p>
@@ -1103,7 +1108,7 @@
           <a:p>
             <a:fld id="{F1C55FD9-E805-0344-84D3-A9CEAACA356E}" type="datetimeFigureOut">
               <a:rPr lang="en-US" smtClean="0"/>
-              <a:t>4/28/21</a:t>
+              <a:t>5/11/21</a:t>
             </a:fld>
             <a:endParaRPr lang="en-US"/>
           </a:p>
@@ -1303,7 +1308,7 @@
           <a:p>
             <a:fld id="{F1C55FD9-E805-0344-84D3-A9CEAACA356E}" type="datetimeFigureOut">
               <a:rPr lang="en-US" smtClean="0"/>
-              <a:t>4/28/21</a:t>
+              <a:t>5/11/21</a:t>
             </a:fld>
             <a:endParaRPr lang="en-US"/>
           </a:p>
@@ -1579,7 +1584,7 @@
           <a:p>
             <a:fld id="{F1C55FD9-E805-0344-84D3-A9CEAACA356E}" type="datetimeFigureOut">
               <a:rPr lang="en-US" smtClean="0"/>
-              <a:t>4/28/21</a:t>
+              <a:t>5/11/21</a:t>
             </a:fld>
             <a:endParaRPr lang="en-US"/>
           </a:p>
@@ -1847,7 +1852,7 @@
           <a:p>
             <a:fld id="{F1C55FD9-E805-0344-84D3-A9CEAACA356E}" type="datetimeFigureOut">
               <a:rPr lang="en-US" smtClean="0"/>
-              <a:t>4/28/21</a:t>
+              <a:t>5/11/21</a:t>
             </a:fld>
             <a:endParaRPr lang="en-US"/>
           </a:p>
@@ -2262,7 +2267,7 @@
           <a:p>
             <a:fld id="{F1C55FD9-E805-0344-84D3-A9CEAACA356E}" type="datetimeFigureOut">
               <a:rPr lang="en-US" smtClean="0"/>
-              <a:t>4/28/21</a:t>
+              <a:t>5/11/21</a:t>
             </a:fld>
             <a:endParaRPr lang="en-US"/>
           </a:p>
@@ -2404,7 +2409,7 @@
           <a:p>
             <a:fld id="{F1C55FD9-E805-0344-84D3-A9CEAACA356E}" type="datetimeFigureOut">
               <a:rPr lang="en-US" smtClean="0"/>
-              <a:t>4/28/21</a:t>
+              <a:t>5/11/21</a:t>
             </a:fld>
             <a:endParaRPr lang="en-US"/>
           </a:p>
@@ -2517,7 +2522,7 @@
           <a:p>
             <a:fld id="{F1C55FD9-E805-0344-84D3-A9CEAACA356E}" type="datetimeFigureOut">
               <a:rPr lang="en-US" smtClean="0"/>
-              <a:t>4/28/21</a:t>
+              <a:t>5/11/21</a:t>
             </a:fld>
             <a:endParaRPr lang="en-US"/>
           </a:p>
@@ -2830,7 +2835,7 @@
           <a:p>
             <a:fld id="{F1C55FD9-E805-0344-84D3-A9CEAACA356E}" type="datetimeFigureOut">
               <a:rPr lang="en-US" smtClean="0"/>
-              <a:t>4/28/21</a:t>
+              <a:t>5/11/21</a:t>
             </a:fld>
             <a:endParaRPr lang="en-US"/>
           </a:p>
@@ -3119,7 +3124,7 @@
           <a:p>
             <a:fld id="{F1C55FD9-E805-0344-84D3-A9CEAACA356E}" type="datetimeFigureOut">
               <a:rPr lang="en-US" smtClean="0"/>
-              <a:t>4/28/21</a:t>
+              <a:t>5/11/21</a:t>
             </a:fld>
             <a:endParaRPr lang="en-US"/>
           </a:p>
@@ -3362,7 +3367,7 @@
           <a:p>
             <a:fld id="{F1C55FD9-E805-0344-84D3-A9CEAACA356E}" type="datetimeFigureOut">
               <a:rPr lang="en-US" smtClean="0"/>
-              <a:t>4/28/21</a:t>
+              <a:t>5/11/21</a:t>
             </a:fld>
             <a:endParaRPr lang="en-US"/>
           </a:p>
@@ -3794,7 +3799,7 @@
         <p:spPr>
           <a:xfrm>
             <a:off x="725214" y="563829"/>
-            <a:ext cx="10836165" cy="2865171"/>
+            <a:ext cx="9007365" cy="2865171"/>
           </a:xfrm>
           <a:prstGeom prst="rect">
             <a:avLst/>
@@ -3845,7 +3850,7 @@
         </p:nvSpPr>
         <p:spPr>
           <a:xfrm>
-            <a:off x="1439916" y="1345324"/>
+            <a:off x="1430783" y="1350373"/>
             <a:ext cx="1671145" cy="1460936"/>
           </a:xfrm>
           <a:prstGeom prst="roundRect">
@@ -3887,10 +3892,10 @@
       </p:sp>
       <p:sp>
         <p:nvSpPr>
-          <p:cNvPr id="5" name="Rounded Rectangle 4">
-            <a:extLst>
-              <a:ext uri="{FF2B5EF4-FFF2-40B4-BE49-F238E27FC236}">
-                <a16:creationId xmlns:a16="http://schemas.microsoft.com/office/drawing/2014/main" id="{69F638EF-1F13-4448-B70F-3751ACB49214}"/>
+          <p:cNvPr id="6" name="Rounded Rectangle 5">
+            <a:extLst>
+              <a:ext uri="{FF2B5EF4-FFF2-40B4-BE49-F238E27FC236}">
+                <a16:creationId xmlns:a16="http://schemas.microsoft.com/office/drawing/2014/main" id="{CDB2E142-9906-714C-8971-73ABBF18C186}"/>
               </a:ext>
             </a:extLst>
           </p:cNvPr>
@@ -3899,7 +3904,438 @@
         </p:nvSpPr>
         <p:spPr>
           <a:xfrm>
-            <a:off x="3505198" y="1345323"/>
+            <a:off x="3492581" y="1379687"/>
+            <a:ext cx="1671145" cy="1460938"/>
+          </a:xfrm>
+          <a:prstGeom prst="roundRect">
+            <a:avLst/>
+          </a:prstGeom>
+          <a:solidFill>
+            <a:schemeClr val="tx2">
+              <a:lumMod val="75000"/>
+            </a:schemeClr>
+          </a:solidFill>
+        </p:spPr>
+        <p:style>
+          <a:lnRef idx="2">
+            <a:schemeClr val="accent1">
+              <a:shade val="50000"/>
+            </a:schemeClr>
+          </a:lnRef>
+          <a:fillRef idx="1">
+            <a:schemeClr val="accent1"/>
+          </a:fillRef>
+          <a:effectRef idx="0">
+            <a:schemeClr val="accent1"/>
+          </a:effectRef>
+          <a:fontRef idx="minor">
+            <a:schemeClr val="lt1"/>
+          </a:fontRef>
+        </p:style>
+        <p:txBody>
+          <a:bodyPr rtlCol="0" anchor="ctr"/>
+          <a:lstStyle/>
+          <a:p>
+            <a:pPr algn="ctr"/>
+            <a:r>
+              <a:rPr lang="en-US" dirty="0"/>
+              <a:t>Red Hat OpenShift</a:t>
+            </a:r>
+          </a:p>
+        </p:txBody>
+      </p:sp>
+      <p:sp>
+        <p:nvSpPr>
+          <p:cNvPr id="7" name="Rounded Rectangle 6">
+            <a:extLst>
+              <a:ext uri="{FF2B5EF4-FFF2-40B4-BE49-F238E27FC236}">
+                <a16:creationId xmlns:a16="http://schemas.microsoft.com/office/drawing/2014/main" id="{FE6E7D06-2B34-4449-9FD0-30B3C6A2D0A1}"/>
+              </a:ext>
+            </a:extLst>
+          </p:cNvPr>
+          <p:cNvSpPr/>
+          <p:nvPr/>
+        </p:nvSpPr>
+        <p:spPr>
+          <a:xfrm>
+            <a:off x="5550896" y="1416370"/>
+            <a:ext cx="1671145" cy="1460936"/>
+          </a:xfrm>
+          <a:prstGeom prst="roundRect">
+            <a:avLst/>
+          </a:prstGeom>
+          <a:solidFill>
+            <a:schemeClr val="tx2">
+              <a:lumMod val="75000"/>
+            </a:schemeClr>
+          </a:solidFill>
+        </p:spPr>
+        <p:style>
+          <a:lnRef idx="2">
+            <a:schemeClr val="accent1">
+              <a:shade val="50000"/>
+            </a:schemeClr>
+          </a:lnRef>
+          <a:fillRef idx="1">
+            <a:schemeClr val="accent1"/>
+          </a:fillRef>
+          <a:effectRef idx="0">
+            <a:schemeClr val="accent1"/>
+          </a:effectRef>
+          <a:fontRef idx="minor">
+            <a:schemeClr val="lt1"/>
+          </a:fontRef>
+        </p:style>
+        <p:txBody>
+          <a:bodyPr rtlCol="0" anchor="ctr"/>
+          <a:lstStyle/>
+          <a:p>
+            <a:pPr algn="ctr"/>
+            <a:r>
+              <a:rPr lang="en-US" dirty="0"/>
+              <a:t>Code Ready Containers</a:t>
+            </a:r>
+          </a:p>
+        </p:txBody>
+      </p:sp>
+      <p:sp>
+        <p:nvSpPr>
+          <p:cNvPr id="8" name="Rounded Rectangle 7">
+            <a:extLst>
+              <a:ext uri="{FF2B5EF4-FFF2-40B4-BE49-F238E27FC236}">
+                <a16:creationId xmlns:a16="http://schemas.microsoft.com/office/drawing/2014/main" id="{E4348F60-61CA-9A4D-8824-19127A233280}"/>
+              </a:ext>
+            </a:extLst>
+          </p:cNvPr>
+          <p:cNvSpPr/>
+          <p:nvPr/>
+        </p:nvSpPr>
+        <p:spPr>
+          <a:xfrm>
+            <a:off x="7616178" y="1416369"/>
+            <a:ext cx="1671145" cy="1460935"/>
+          </a:xfrm>
+          <a:prstGeom prst="roundRect">
+            <a:avLst/>
+          </a:prstGeom>
+          <a:solidFill>
+            <a:schemeClr val="tx2">
+              <a:lumMod val="75000"/>
+            </a:schemeClr>
+          </a:solidFill>
+        </p:spPr>
+        <p:style>
+          <a:lnRef idx="2">
+            <a:schemeClr val="accent1">
+              <a:shade val="50000"/>
+            </a:schemeClr>
+          </a:lnRef>
+          <a:fillRef idx="1">
+            <a:schemeClr val="accent1"/>
+          </a:fillRef>
+          <a:effectRef idx="0">
+            <a:schemeClr val="accent1"/>
+          </a:effectRef>
+          <a:fontRef idx="minor">
+            <a:schemeClr val="lt1"/>
+          </a:fontRef>
+        </p:style>
+        <p:txBody>
+          <a:bodyPr rtlCol="0" anchor="ctr"/>
+          <a:lstStyle/>
+          <a:p>
+            <a:pPr algn="ctr"/>
+            <a:r>
+              <a:rPr lang="en-US" dirty="0"/>
+              <a:t>Open Lab cluster</a:t>
+            </a:r>
+          </a:p>
+        </p:txBody>
+      </p:sp>
+      <p:sp>
+        <p:nvSpPr>
+          <p:cNvPr id="9" name="TextBox 8">
+            <a:extLst>
+              <a:ext uri="{FF2B5EF4-FFF2-40B4-BE49-F238E27FC236}">
+                <a16:creationId xmlns:a16="http://schemas.microsoft.com/office/drawing/2014/main" id="{F5475DD9-72C7-EF4A-A9E2-B1B9F16651F8}"/>
+              </a:ext>
+            </a:extLst>
+          </p:cNvPr>
+          <p:cNvSpPr txBox="1"/>
+          <p:nvPr/>
+        </p:nvSpPr>
+        <p:spPr>
+          <a:xfrm>
+            <a:off x="-241027" y="1803802"/>
+            <a:ext cx="2581476" cy="400110"/>
+          </a:xfrm>
+          <a:prstGeom prst="rect">
+            <a:avLst/>
+          </a:prstGeom>
+          <a:noFill/>
+        </p:spPr>
+        <p:txBody>
+          <a:bodyPr wrap="none" rtlCol="0">
+            <a:spAutoFit/>
+            <a:scene3d>
+              <a:camera prst="orthographicFront">
+                <a:rot lat="0" lon="0" rev="5400000"/>
+              </a:camera>
+              <a:lightRig rig="threePt" dir="t"/>
+            </a:scene3d>
+          </a:bodyPr>
+          <a:lstStyle/>
+          <a:p>
+            <a:r>
+              <a:rPr lang="en-US" sz="2000" b="1" dirty="0"/>
+              <a:t>Bring your own cluster</a:t>
+            </a:r>
+          </a:p>
+        </p:txBody>
+      </p:sp>
+      <p:sp>
+        <p:nvSpPr>
+          <p:cNvPr id="11" name="TextBox 10">
+            <a:extLst>
+              <a:ext uri="{FF2B5EF4-FFF2-40B4-BE49-F238E27FC236}">
+                <a16:creationId xmlns:a16="http://schemas.microsoft.com/office/drawing/2014/main" id="{9DA54821-4A8D-1341-90A7-B9104317A817}"/>
+              </a:ext>
+            </a:extLst>
+          </p:cNvPr>
+          <p:cNvSpPr txBox="1"/>
+          <p:nvPr/>
+        </p:nvSpPr>
+        <p:spPr>
+          <a:xfrm>
+            <a:off x="1641379" y="837492"/>
+            <a:ext cx="1159292" cy="369332"/>
+          </a:xfrm>
+          <a:prstGeom prst="rect">
+            <a:avLst/>
+          </a:prstGeom>
+          <a:noFill/>
+        </p:spPr>
+        <p:txBody>
+          <a:bodyPr wrap="none" rtlCol="0">
+            <a:spAutoFit/>
+          </a:bodyPr>
+          <a:lstStyle/>
+          <a:p>
+            <a:r>
+              <a:rPr lang="en-US" dirty="0"/>
+              <a:t>IBM Cloud</a:t>
+            </a:r>
+          </a:p>
+        </p:txBody>
+      </p:sp>
+      <p:sp>
+        <p:nvSpPr>
+          <p:cNvPr id="12" name="TextBox 11">
+            <a:extLst>
+              <a:ext uri="{FF2B5EF4-FFF2-40B4-BE49-F238E27FC236}">
+                <a16:creationId xmlns:a16="http://schemas.microsoft.com/office/drawing/2014/main" id="{8DEE868D-9691-7F4E-87EA-C4B823E8B53E}"/>
+              </a:ext>
+            </a:extLst>
+          </p:cNvPr>
+          <p:cNvSpPr txBox="1"/>
+          <p:nvPr/>
+        </p:nvSpPr>
+        <p:spPr>
+          <a:xfrm>
+            <a:off x="3492581" y="698993"/>
+            <a:ext cx="3729460" cy="646331"/>
+          </a:xfrm>
+          <a:prstGeom prst="rect">
+            <a:avLst/>
+          </a:prstGeom>
+          <a:noFill/>
+        </p:spPr>
+        <p:txBody>
+          <a:bodyPr wrap="square" rtlCol="0">
+            <a:spAutoFit/>
+          </a:bodyPr>
+          <a:lstStyle/>
+          <a:p>
+            <a:pPr algn="ctr"/>
+            <a:r>
+              <a:rPr lang="en-US" dirty="0"/>
+              <a:t>Bare metal, virtualized infrastructure</a:t>
+            </a:r>
+          </a:p>
+          <a:p>
+            <a:pPr algn="ctr"/>
+            <a:r>
+              <a:rPr lang="en-US" dirty="0"/>
+              <a:t>or 3</a:t>
+            </a:r>
+            <a:r>
+              <a:rPr lang="en-US" baseline="30000" dirty="0"/>
+              <a:t>rd</a:t>
+            </a:r>
+            <a:r>
+              <a:rPr lang="en-US" dirty="0"/>
+              <a:t> party clouds</a:t>
+            </a:r>
+          </a:p>
+        </p:txBody>
+      </p:sp>
+      <p:sp>
+        <p:nvSpPr>
+          <p:cNvPr id="13" name="TextBox 12">
+            <a:extLst>
+              <a:ext uri="{FF2B5EF4-FFF2-40B4-BE49-F238E27FC236}">
+                <a16:creationId xmlns:a16="http://schemas.microsoft.com/office/drawing/2014/main" id="{F0D6D5FB-EDD9-7040-944B-5F3DDB8F2702}"/>
+              </a:ext>
+            </a:extLst>
+          </p:cNvPr>
+          <p:cNvSpPr txBox="1"/>
+          <p:nvPr/>
+        </p:nvSpPr>
+        <p:spPr>
+          <a:xfrm>
+            <a:off x="7755918" y="702457"/>
+            <a:ext cx="1391663" cy="646331"/>
+          </a:xfrm>
+          <a:prstGeom prst="rect">
+            <a:avLst/>
+          </a:prstGeom>
+          <a:noFill/>
+        </p:spPr>
+        <p:txBody>
+          <a:bodyPr wrap="none" rtlCol="0">
+            <a:spAutoFit/>
+          </a:bodyPr>
+          <a:lstStyle/>
+          <a:p>
+            <a:pPr algn="ctr"/>
+            <a:r>
+              <a:rPr lang="en-US" dirty="0"/>
+              <a:t>Learning</a:t>
+            </a:r>
+          </a:p>
+          <a:p>
+            <a:r>
+              <a:rPr lang="en-US" dirty="0"/>
+              <a:t>environment</a:t>
+            </a:r>
+          </a:p>
+        </p:txBody>
+      </p:sp>
+      <p:sp>
+        <p:nvSpPr>
+          <p:cNvPr id="15" name="Rectangle 14">
+            <a:extLst>
+              <a:ext uri="{FF2B5EF4-FFF2-40B4-BE49-F238E27FC236}">
+                <a16:creationId xmlns:a16="http://schemas.microsoft.com/office/drawing/2014/main" id="{AF1F9D16-6A71-A741-85EC-9C05FE98FCE1}"/>
+              </a:ext>
+            </a:extLst>
+          </p:cNvPr>
+          <p:cNvSpPr/>
+          <p:nvPr/>
+        </p:nvSpPr>
+        <p:spPr>
+          <a:xfrm>
+            <a:off x="725214" y="3587752"/>
+            <a:ext cx="9007365" cy="2706419"/>
+          </a:xfrm>
+          <a:prstGeom prst="rect">
+            <a:avLst/>
+          </a:prstGeom>
+          <a:solidFill>
+            <a:schemeClr val="accent6">
+              <a:lumMod val="40000"/>
+              <a:lumOff val="60000"/>
+            </a:schemeClr>
+          </a:solidFill>
+        </p:spPr>
+        <p:style>
+          <a:lnRef idx="2">
+            <a:schemeClr val="accent1">
+              <a:shade val="50000"/>
+            </a:schemeClr>
+          </a:lnRef>
+          <a:fillRef idx="1">
+            <a:schemeClr val="accent1"/>
+          </a:fillRef>
+          <a:effectRef idx="0">
+            <a:schemeClr val="accent1"/>
+          </a:effectRef>
+          <a:fontRef idx="minor">
+            <a:schemeClr val="lt1"/>
+          </a:fontRef>
+        </p:style>
+        <p:txBody>
+          <a:bodyPr rtlCol="0" anchor="ctr"/>
+          <a:lstStyle/>
+          <a:p>
+            <a:endParaRPr lang="en-US" b="1" dirty="0"/>
+          </a:p>
+        </p:txBody>
+      </p:sp>
+      <p:sp>
+        <p:nvSpPr>
+          <p:cNvPr id="17" name="TextBox 16">
+            <a:extLst>
+              <a:ext uri="{FF2B5EF4-FFF2-40B4-BE49-F238E27FC236}">
+                <a16:creationId xmlns:a16="http://schemas.microsoft.com/office/drawing/2014/main" id="{EBFC4F53-7CC6-9943-B952-32A5948E5458}"/>
+              </a:ext>
+            </a:extLst>
+          </p:cNvPr>
+          <p:cNvSpPr txBox="1"/>
+          <p:nvPr/>
+        </p:nvSpPr>
+        <p:spPr>
+          <a:xfrm>
+            <a:off x="-121604" y="4587018"/>
+            <a:ext cx="2342629" cy="707886"/>
+          </a:xfrm>
+          <a:prstGeom prst="rect">
+            <a:avLst/>
+          </a:prstGeom>
+          <a:noFill/>
+        </p:spPr>
+        <p:txBody>
+          <a:bodyPr wrap="none" rtlCol="0">
+            <a:spAutoFit/>
+            <a:scene3d>
+              <a:camera prst="orthographicFront">
+                <a:rot lat="0" lon="0" rev="5400000"/>
+              </a:camera>
+              <a:lightRig rig="threePt" dir="t"/>
+            </a:scene3d>
+          </a:bodyPr>
+          <a:lstStyle/>
+          <a:p>
+            <a:pPr algn="ctr"/>
+            <a:r>
+              <a:rPr lang="en-US" sz="2000" b="1" dirty="0"/>
+              <a:t>Install the </a:t>
+            </a:r>
+          </a:p>
+          <a:p>
+            <a:pPr algn="ctr"/>
+            <a:r>
+              <a:rPr lang="en-US" sz="2000" b="1" dirty="0"/>
+              <a:t>Cloud-Native Toolkit</a:t>
+            </a:r>
+          </a:p>
+        </p:txBody>
+      </p:sp>
+      <p:sp>
+        <p:nvSpPr>
+          <p:cNvPr id="18" name="Rounded Rectangle 17">
+            <a:extLst>
+              <a:ext uri="{FF2B5EF4-FFF2-40B4-BE49-F238E27FC236}">
+                <a16:creationId xmlns:a16="http://schemas.microsoft.com/office/drawing/2014/main" id="{118E21C0-8519-AF44-AD05-5C3379D19707}"/>
+              </a:ext>
+            </a:extLst>
+          </p:cNvPr>
+          <p:cNvSpPr/>
+          <p:nvPr/>
+        </p:nvSpPr>
+        <p:spPr>
+          <a:xfrm>
+            <a:off x="4521738" y="4289868"/>
             <a:ext cx="1671145" cy="1460937"/>
           </a:xfrm>
           <a:prstGeom prst="roundRect">
@@ -3934,511 +4370,26 @@
             <a:pPr algn="ctr"/>
             <a:r>
               <a:rPr lang="en-US" dirty="0"/>
-              <a:t>Kubernetes on IBM Cloud</a:t>
-            </a:r>
-          </a:p>
-        </p:txBody>
-      </p:sp>
-      <p:sp>
-        <p:nvSpPr>
-          <p:cNvPr id="6" name="Rounded Rectangle 5">
-            <a:extLst>
-              <a:ext uri="{FF2B5EF4-FFF2-40B4-BE49-F238E27FC236}">
-                <a16:creationId xmlns:a16="http://schemas.microsoft.com/office/drawing/2014/main" id="{CDB2E142-9906-714C-8971-73ABBF18C186}"/>
-              </a:ext>
-            </a:extLst>
-          </p:cNvPr>
-          <p:cNvSpPr/>
+              <a:t>Run the fast-start Toolkit installer</a:t>
+            </a:r>
+          </a:p>
+        </p:txBody>
+      </p:sp>
+      <p:sp>
+        <p:nvSpPr>
+          <p:cNvPr id="19" name="TextBox 18">
+            <a:extLst>
+              <a:ext uri="{FF2B5EF4-FFF2-40B4-BE49-F238E27FC236}">
+                <a16:creationId xmlns:a16="http://schemas.microsoft.com/office/drawing/2014/main" id="{C26AFE40-9B40-9345-BF18-F5A0F66D34E0}"/>
+              </a:ext>
+            </a:extLst>
+          </p:cNvPr>
+          <p:cNvSpPr txBox="1"/>
           <p:nvPr/>
         </p:nvSpPr>
         <p:spPr>
           <a:xfrm>
-            <a:off x="5570480" y="1345324"/>
-            <a:ext cx="1671145" cy="1460938"/>
-          </a:xfrm>
-          <a:prstGeom prst="roundRect">
-            <a:avLst/>
-          </a:prstGeom>
-          <a:solidFill>
-            <a:schemeClr val="tx2">
-              <a:lumMod val="75000"/>
-            </a:schemeClr>
-          </a:solidFill>
-        </p:spPr>
-        <p:style>
-          <a:lnRef idx="2">
-            <a:schemeClr val="accent1">
-              <a:shade val="50000"/>
-            </a:schemeClr>
-          </a:lnRef>
-          <a:fillRef idx="1">
-            <a:schemeClr val="accent1"/>
-          </a:fillRef>
-          <a:effectRef idx="0">
-            <a:schemeClr val="accent1"/>
-          </a:effectRef>
-          <a:fontRef idx="minor">
-            <a:schemeClr val="lt1"/>
-          </a:fontRef>
-        </p:style>
-        <p:txBody>
-          <a:bodyPr rtlCol="0" anchor="ctr"/>
-          <a:lstStyle/>
-          <a:p>
-            <a:pPr algn="ctr"/>
-            <a:r>
-              <a:rPr lang="en-US" dirty="0"/>
-              <a:t>Red Hat OpenShift or OKD</a:t>
-            </a:r>
-          </a:p>
-        </p:txBody>
-      </p:sp>
-      <p:sp>
-        <p:nvSpPr>
-          <p:cNvPr id="7" name="Rounded Rectangle 6">
-            <a:extLst>
-              <a:ext uri="{FF2B5EF4-FFF2-40B4-BE49-F238E27FC236}">
-                <a16:creationId xmlns:a16="http://schemas.microsoft.com/office/drawing/2014/main" id="{FE6E7D06-2B34-4449-9FD0-30B3C6A2D0A1}"/>
-              </a:ext>
-            </a:extLst>
-          </p:cNvPr>
-          <p:cNvSpPr/>
-          <p:nvPr/>
-        </p:nvSpPr>
-        <p:spPr>
-          <a:xfrm>
-            <a:off x="7635762" y="1345324"/>
-            <a:ext cx="1671145" cy="1460936"/>
-          </a:xfrm>
-          <a:prstGeom prst="roundRect">
-            <a:avLst/>
-          </a:prstGeom>
-          <a:solidFill>
-            <a:schemeClr val="tx2">
-              <a:lumMod val="75000"/>
-            </a:schemeClr>
-          </a:solidFill>
-        </p:spPr>
-        <p:style>
-          <a:lnRef idx="2">
-            <a:schemeClr val="accent1">
-              <a:shade val="50000"/>
-            </a:schemeClr>
-          </a:lnRef>
-          <a:fillRef idx="1">
-            <a:schemeClr val="accent1"/>
-          </a:fillRef>
-          <a:effectRef idx="0">
-            <a:schemeClr val="accent1"/>
-          </a:effectRef>
-          <a:fontRef idx="minor">
-            <a:schemeClr val="lt1"/>
-          </a:fontRef>
-        </p:style>
-        <p:txBody>
-          <a:bodyPr rtlCol="0" anchor="ctr"/>
-          <a:lstStyle/>
-          <a:p>
-            <a:pPr algn="ctr"/>
-            <a:r>
-              <a:rPr lang="en-US" dirty="0"/>
-              <a:t>Code Ready Containers</a:t>
-            </a:r>
-          </a:p>
-        </p:txBody>
-      </p:sp>
-      <p:sp>
-        <p:nvSpPr>
-          <p:cNvPr id="8" name="Rounded Rectangle 7">
-            <a:extLst>
-              <a:ext uri="{FF2B5EF4-FFF2-40B4-BE49-F238E27FC236}">
-                <a16:creationId xmlns:a16="http://schemas.microsoft.com/office/drawing/2014/main" id="{E4348F60-61CA-9A4D-8824-19127A233280}"/>
-              </a:ext>
-            </a:extLst>
-          </p:cNvPr>
-          <p:cNvSpPr/>
-          <p:nvPr/>
-        </p:nvSpPr>
-        <p:spPr>
-          <a:xfrm>
-            <a:off x="9701044" y="1345323"/>
-            <a:ext cx="1671145" cy="1460935"/>
-          </a:xfrm>
-          <a:prstGeom prst="roundRect">
-            <a:avLst/>
-          </a:prstGeom>
-          <a:solidFill>
-            <a:schemeClr val="tx2">
-              <a:lumMod val="75000"/>
-            </a:schemeClr>
-          </a:solidFill>
-        </p:spPr>
-        <p:style>
-          <a:lnRef idx="2">
-            <a:schemeClr val="accent1">
-              <a:shade val="50000"/>
-            </a:schemeClr>
-          </a:lnRef>
-          <a:fillRef idx="1">
-            <a:schemeClr val="accent1"/>
-          </a:fillRef>
-          <a:effectRef idx="0">
-            <a:schemeClr val="accent1"/>
-          </a:effectRef>
-          <a:fontRef idx="minor">
-            <a:schemeClr val="lt1"/>
-          </a:fontRef>
-        </p:style>
-        <p:txBody>
-          <a:bodyPr rtlCol="0" anchor="ctr"/>
-          <a:lstStyle/>
-          <a:p>
-            <a:pPr algn="ctr"/>
-            <a:r>
-              <a:rPr lang="en-US" dirty="0"/>
-              <a:t>Open Lab cluster</a:t>
-            </a:r>
-          </a:p>
-        </p:txBody>
-      </p:sp>
-      <p:sp>
-        <p:nvSpPr>
-          <p:cNvPr id="9" name="TextBox 8">
-            <a:extLst>
-              <a:ext uri="{FF2B5EF4-FFF2-40B4-BE49-F238E27FC236}">
-                <a16:creationId xmlns:a16="http://schemas.microsoft.com/office/drawing/2014/main" id="{F5475DD9-72C7-EF4A-A9E2-B1B9F16651F8}"/>
-              </a:ext>
-            </a:extLst>
-          </p:cNvPr>
-          <p:cNvSpPr txBox="1"/>
-          <p:nvPr/>
-        </p:nvSpPr>
-        <p:spPr>
-          <a:xfrm>
-            <a:off x="-241027" y="1803802"/>
-            <a:ext cx="2581476" cy="400110"/>
-          </a:xfrm>
-          <a:prstGeom prst="rect">
-            <a:avLst/>
-          </a:prstGeom>
-          <a:noFill/>
-        </p:spPr>
-        <p:txBody>
-          <a:bodyPr wrap="none" rtlCol="0">
-            <a:spAutoFit/>
-            <a:scene3d>
-              <a:camera prst="orthographicFront">
-                <a:rot lat="0" lon="0" rev="5400000"/>
-              </a:camera>
-              <a:lightRig rig="threePt" dir="t"/>
-            </a:scene3d>
-          </a:bodyPr>
-          <a:lstStyle/>
-          <a:p>
-            <a:r>
-              <a:rPr lang="en-US" sz="2000" b="1" dirty="0"/>
-              <a:t>Bring your own cluster</a:t>
-            </a:r>
-          </a:p>
-        </p:txBody>
-      </p:sp>
-      <p:sp>
-        <p:nvSpPr>
-          <p:cNvPr id="11" name="TextBox 10">
-            <a:extLst>
-              <a:ext uri="{FF2B5EF4-FFF2-40B4-BE49-F238E27FC236}">
-                <a16:creationId xmlns:a16="http://schemas.microsoft.com/office/drawing/2014/main" id="{9DA54821-4A8D-1341-90A7-B9104317A817}"/>
-              </a:ext>
-            </a:extLst>
-          </p:cNvPr>
-          <p:cNvSpPr txBox="1"/>
-          <p:nvPr/>
-        </p:nvSpPr>
-        <p:spPr>
-          <a:xfrm>
-            <a:off x="2743329" y="769910"/>
-            <a:ext cx="1159292" cy="369332"/>
-          </a:xfrm>
-          <a:prstGeom prst="rect">
-            <a:avLst/>
-          </a:prstGeom>
-          <a:noFill/>
-        </p:spPr>
-        <p:txBody>
-          <a:bodyPr wrap="none" rtlCol="0">
-            <a:spAutoFit/>
-          </a:bodyPr>
-          <a:lstStyle/>
-          <a:p>
-            <a:r>
-              <a:rPr lang="en-US" dirty="0"/>
-              <a:t>IBM Cloud</a:t>
-            </a:r>
-          </a:p>
-        </p:txBody>
-      </p:sp>
-      <p:sp>
-        <p:nvSpPr>
-          <p:cNvPr id="12" name="TextBox 11">
-            <a:extLst>
-              <a:ext uri="{FF2B5EF4-FFF2-40B4-BE49-F238E27FC236}">
-                <a16:creationId xmlns:a16="http://schemas.microsoft.com/office/drawing/2014/main" id="{8DEE868D-9691-7F4E-87EA-C4B823E8B53E}"/>
-              </a:ext>
-            </a:extLst>
-          </p:cNvPr>
-          <p:cNvSpPr txBox="1"/>
-          <p:nvPr/>
-        </p:nvSpPr>
-        <p:spPr>
-          <a:xfrm>
-            <a:off x="5577447" y="627947"/>
-            <a:ext cx="3729460" cy="646331"/>
-          </a:xfrm>
-          <a:prstGeom prst="rect">
-            <a:avLst/>
-          </a:prstGeom>
-          <a:noFill/>
-        </p:spPr>
-        <p:txBody>
-          <a:bodyPr wrap="square" rtlCol="0">
-            <a:spAutoFit/>
-          </a:bodyPr>
-          <a:lstStyle/>
-          <a:p>
-            <a:pPr algn="ctr"/>
-            <a:r>
-              <a:rPr lang="en-US" dirty="0"/>
-              <a:t>Bare metal, virtualized infrastructure</a:t>
-            </a:r>
-          </a:p>
-          <a:p>
-            <a:pPr algn="ctr"/>
-            <a:r>
-              <a:rPr lang="en-US" dirty="0"/>
-              <a:t>or 3</a:t>
-            </a:r>
-            <a:r>
-              <a:rPr lang="en-US" baseline="30000" dirty="0"/>
-              <a:t>rd</a:t>
-            </a:r>
-            <a:r>
-              <a:rPr lang="en-US" dirty="0"/>
-              <a:t> party clouds</a:t>
-            </a:r>
-          </a:p>
-        </p:txBody>
-      </p:sp>
-      <p:sp>
-        <p:nvSpPr>
-          <p:cNvPr id="13" name="TextBox 12">
-            <a:extLst>
-              <a:ext uri="{FF2B5EF4-FFF2-40B4-BE49-F238E27FC236}">
-                <a16:creationId xmlns:a16="http://schemas.microsoft.com/office/drawing/2014/main" id="{F0D6D5FB-EDD9-7040-944B-5F3DDB8F2702}"/>
-              </a:ext>
-            </a:extLst>
-          </p:cNvPr>
-          <p:cNvSpPr txBox="1"/>
-          <p:nvPr/>
-        </p:nvSpPr>
-        <p:spPr>
-          <a:xfrm>
-            <a:off x="9840784" y="631411"/>
-            <a:ext cx="1391663" cy="646331"/>
-          </a:xfrm>
-          <a:prstGeom prst="rect">
-            <a:avLst/>
-          </a:prstGeom>
-          <a:noFill/>
-        </p:spPr>
-        <p:txBody>
-          <a:bodyPr wrap="none" rtlCol="0">
-            <a:spAutoFit/>
-          </a:bodyPr>
-          <a:lstStyle/>
-          <a:p>
-            <a:pPr algn="ctr"/>
-            <a:r>
-              <a:rPr lang="en-US" dirty="0"/>
-              <a:t>Learning</a:t>
-            </a:r>
-          </a:p>
-          <a:p>
-            <a:r>
-              <a:rPr lang="en-US" dirty="0"/>
-              <a:t>environment</a:t>
-            </a:r>
-          </a:p>
-        </p:txBody>
-      </p:sp>
-      <p:sp>
-        <p:nvSpPr>
-          <p:cNvPr id="15" name="Rectangle 14">
-            <a:extLst>
-              <a:ext uri="{FF2B5EF4-FFF2-40B4-BE49-F238E27FC236}">
-                <a16:creationId xmlns:a16="http://schemas.microsoft.com/office/drawing/2014/main" id="{AF1F9D16-6A71-A741-85EC-9C05FE98FCE1}"/>
-              </a:ext>
-            </a:extLst>
-          </p:cNvPr>
-          <p:cNvSpPr/>
-          <p:nvPr/>
-        </p:nvSpPr>
-        <p:spPr>
-          <a:xfrm>
-            <a:off x="725214" y="3587752"/>
-            <a:ext cx="10836165" cy="2865171"/>
-          </a:xfrm>
-          <a:prstGeom prst="rect">
-            <a:avLst/>
-          </a:prstGeom>
-          <a:solidFill>
-            <a:schemeClr val="accent6">
-              <a:lumMod val="40000"/>
-              <a:lumOff val="60000"/>
-            </a:schemeClr>
-          </a:solidFill>
-        </p:spPr>
-        <p:style>
-          <a:lnRef idx="2">
-            <a:schemeClr val="accent1">
-              <a:shade val="50000"/>
-            </a:schemeClr>
-          </a:lnRef>
-          <a:fillRef idx="1">
-            <a:schemeClr val="accent1"/>
-          </a:fillRef>
-          <a:effectRef idx="0">
-            <a:schemeClr val="accent1"/>
-          </a:effectRef>
-          <a:fontRef idx="minor">
-            <a:schemeClr val="lt1"/>
-          </a:fontRef>
-        </p:style>
-        <p:txBody>
-          <a:bodyPr rtlCol="0" anchor="ctr"/>
-          <a:lstStyle/>
-          <a:p>
-            <a:endParaRPr lang="en-US" b="1" dirty="0"/>
-          </a:p>
-        </p:txBody>
-      </p:sp>
-      <p:sp>
-        <p:nvSpPr>
-          <p:cNvPr id="17" name="TextBox 16">
-            <a:extLst>
-              <a:ext uri="{FF2B5EF4-FFF2-40B4-BE49-F238E27FC236}">
-                <a16:creationId xmlns:a16="http://schemas.microsoft.com/office/drawing/2014/main" id="{EBFC4F53-7CC6-9943-B952-32A5948E5458}"/>
-              </a:ext>
-            </a:extLst>
-          </p:cNvPr>
-          <p:cNvSpPr txBox="1"/>
-          <p:nvPr/>
-        </p:nvSpPr>
-        <p:spPr>
-          <a:xfrm>
-            <a:off x="-121604" y="4666394"/>
-            <a:ext cx="2342629" cy="707886"/>
-          </a:xfrm>
-          <a:prstGeom prst="rect">
-            <a:avLst/>
-          </a:prstGeom>
-          <a:noFill/>
-        </p:spPr>
-        <p:txBody>
-          <a:bodyPr wrap="none" rtlCol="0">
-            <a:spAutoFit/>
-            <a:scene3d>
-              <a:camera prst="orthographicFront">
-                <a:rot lat="0" lon="0" rev="5400000"/>
-              </a:camera>
-              <a:lightRig rig="threePt" dir="t"/>
-            </a:scene3d>
-          </a:bodyPr>
-          <a:lstStyle/>
-          <a:p>
-            <a:pPr algn="ctr"/>
-            <a:r>
-              <a:rPr lang="en-US" sz="2000" b="1" dirty="0"/>
-              <a:t>Install the </a:t>
-            </a:r>
-          </a:p>
-          <a:p>
-            <a:pPr algn="ctr"/>
-            <a:r>
-              <a:rPr lang="en-US" sz="2000" b="1" dirty="0"/>
-              <a:t>Cloud-Native Toolkit</a:t>
-            </a:r>
-          </a:p>
-        </p:txBody>
-      </p:sp>
-      <p:sp>
-        <p:nvSpPr>
-          <p:cNvPr id="18" name="Rounded Rectangle 17">
-            <a:extLst>
-              <a:ext uri="{FF2B5EF4-FFF2-40B4-BE49-F238E27FC236}">
-                <a16:creationId xmlns:a16="http://schemas.microsoft.com/office/drawing/2014/main" id="{118E21C0-8519-AF44-AD05-5C3379D19707}"/>
-              </a:ext>
-            </a:extLst>
-          </p:cNvPr>
-          <p:cNvSpPr/>
-          <p:nvPr/>
-        </p:nvSpPr>
-        <p:spPr>
-          <a:xfrm>
-            <a:off x="5577447" y="4289868"/>
-            <a:ext cx="1671145" cy="1460937"/>
-          </a:xfrm>
-          <a:prstGeom prst="roundRect">
-            <a:avLst/>
-          </a:prstGeom>
-          <a:solidFill>
-            <a:schemeClr val="tx2">
-              <a:lumMod val="75000"/>
-            </a:schemeClr>
-          </a:solidFill>
-        </p:spPr>
-        <p:style>
-          <a:lnRef idx="2">
-            <a:schemeClr val="accent1">
-              <a:shade val="50000"/>
-            </a:schemeClr>
-          </a:lnRef>
-          <a:fillRef idx="1">
-            <a:schemeClr val="accent1"/>
-          </a:fillRef>
-          <a:effectRef idx="0">
-            <a:schemeClr val="accent1"/>
-          </a:effectRef>
-          <a:fontRef idx="minor">
-            <a:schemeClr val="lt1"/>
-          </a:fontRef>
-        </p:style>
-        <p:txBody>
-          <a:bodyPr rtlCol="0" anchor="ctr"/>
-          <a:lstStyle/>
-          <a:p>
-            <a:pPr algn="ctr"/>
-            <a:r>
-              <a:rPr lang="en-US" dirty="0"/>
-              <a:t>Run the fast-start Toolkit installer</a:t>
-            </a:r>
-          </a:p>
-        </p:txBody>
-      </p:sp>
-      <p:sp>
-        <p:nvSpPr>
-          <p:cNvPr id="19" name="TextBox 18">
-            <a:extLst>
-              <a:ext uri="{FF2B5EF4-FFF2-40B4-BE49-F238E27FC236}">
-                <a16:creationId xmlns:a16="http://schemas.microsoft.com/office/drawing/2014/main" id="{C26AFE40-9B40-9345-BF18-F5A0F66D34E0}"/>
-              </a:ext>
-            </a:extLst>
-          </p:cNvPr>
-          <p:cNvSpPr txBox="1"/>
-          <p:nvPr/>
-        </p:nvSpPr>
-        <p:spPr>
-          <a:xfrm>
-            <a:off x="2497354" y="2948350"/>
+            <a:off x="1448613" y="2948536"/>
             <a:ext cx="7817396" cy="338554"/>
           </a:xfrm>
           <a:prstGeom prst="rect">
@@ -4473,7 +4424,7 @@
         </p:nvSpPr>
         <p:spPr>
           <a:xfrm>
-            <a:off x="5130350" y="143467"/>
+            <a:off x="4081609" y="23428"/>
             <a:ext cx="2551404" cy="523220"/>
           </a:xfrm>
           <a:prstGeom prst="rect">

</xml_diff>